<commit_message>
updated cloud design patterns files
</commit_message>
<xml_diff>
--- a/012-Cloud-Design-Patterns/Cloud-Design-Patterns.pptx
+++ b/012-Cloud-Design-Patterns/Cloud-Design-Patterns.pptx
@@ -16,16 +16,17 @@
     <p:sldId id="261" r:id="rId11"/>
     <p:sldId id="262" r:id="rId12"/>
     <p:sldId id="263" r:id="rId13"/>
+    <p:sldId id="264" r:id="rId14"/>
   </p:sldIdLst>
   <p:sldSz cy="5143500" cx="9144000"/>
   <p:notesSz cx="6858000" cy="9144000"/>
   <p:embeddedFontLst>
     <p:embeddedFont>
       <p:font typeface="Montserrat SemiBold"/>
-      <p:regular r:id="rId14"/>
-      <p:bold r:id="rId15"/>
-      <p:italic r:id="rId16"/>
-      <p:boldItalic r:id="rId17"/>
+      <p:regular r:id="rId15"/>
+      <p:bold r:id="rId16"/>
+      <p:italic r:id="rId17"/>
+      <p:boldItalic r:id="rId18"/>
     </p:embeddedFont>
   </p:embeddedFontLst>
   <p:defaultTextStyle>
@@ -1459,7 +1460,7 @@
       </p:grpSpPr>
       <p:sp>
         <p:nvSpPr>
-          <p:cNvPr id="110" name="Google Shape;110;g18980660da4_0_61:notes"/>
+          <p:cNvPr id="110" name="Google Shape;110;g21762ee5c07_0_1:notes"/>
           <p:cNvSpPr txBox="1"/>
           <p:nvPr>
             <p:ph idx="1" type="body"/>
@@ -1498,7 +1499,106 @@
       </p:sp>
       <p:sp>
         <p:nvSpPr>
-          <p:cNvPr id="111" name="Google Shape;111;g18980660da4_0_61:notes"/>
+          <p:cNvPr id="111" name="Google Shape;111;g21762ee5c07_0_1:notes"/>
+          <p:cNvSpPr/>
+          <p:nvPr>
+            <p:ph idx="2" type="sldImg"/>
+          </p:nvPr>
+        </p:nvSpPr>
+        <p:spPr>
+          <a:xfrm>
+            <a:off x="2271749" y="1143642"/>
+            <a:ext cx="2314500" cy="3085800"/>
+          </a:xfrm>
+          <a:custGeom>
+            <a:rect b="b" l="l" r="r" t="t"/>
+            <a:pathLst>
+              <a:path extrusionOk="0" h="120000" w="120000">
+                <a:moveTo>
+                  <a:pt x="0" y="0"/>
+                </a:moveTo>
+                <a:lnTo>
+                  <a:pt x="120000" y="0"/>
+                </a:lnTo>
+                <a:lnTo>
+                  <a:pt x="120000" y="120000"/>
+                </a:lnTo>
+                <a:lnTo>
+                  <a:pt x="0" y="120000"/>
+                </a:lnTo>
+                <a:close/>
+              </a:path>
+            </a:pathLst>
+          </a:custGeom>
+        </p:spPr>
+      </p:sp>
+    </p:spTree>
+  </p:cSld>
+  <p:clrMapOvr>
+    <a:masterClrMapping/>
+  </p:clrMapOvr>
+</p:notes>
+</file>
+
+<file path=ppt/notesSlides/notesSlide9.xml><?xml version="1.0" encoding="utf-8"?>
+<p:notes xmlns:a="http://schemas.openxmlformats.org/drawingml/2006/main" xmlns:r="http://schemas.openxmlformats.org/officeDocument/2006/relationships" xmlns:mc="http://schemas.openxmlformats.org/markup-compatibility/2006" xmlns:mv="urn:schemas-microsoft-com:mac:vml" xmlns:p="http://schemas.openxmlformats.org/presentationml/2006/main" xmlns:c="http://schemas.openxmlformats.org/drawingml/2006/chart" xmlns:dgm="http://schemas.openxmlformats.org/drawingml/2006/diagram" xmlns:o="urn:schemas-microsoft-com:office:office" xmlns:v="urn:schemas-microsoft-com:vml" xmlns:pvml="urn:schemas-microsoft-com:office:powerpoint" xmlns:com="http://schemas.openxmlformats.org/drawingml/2006/compatibility" xmlns:p14="http://schemas.microsoft.com/office/powerpoint/2010/main" xmlns:p15="http://schemas.microsoft.com/office/powerpoint/2012/main" xmlns:ahyp="http://schemas.microsoft.com/office/drawing/2018/hyperlinkcolor" showMasterPhAnim="0" showMasterSp="0">
+  <p:cSld>
+    <p:spTree>
+      <p:nvGrpSpPr>
+        <p:cNvPr id="117" name="Shape 117"/>
+        <p:cNvGrpSpPr/>
+        <p:nvPr/>
+      </p:nvGrpSpPr>
+      <p:grpSpPr>
+        <a:xfrm>
+          <a:off x="0" y="0"/>
+          <a:ext cx="0" cy="0"/>
+          <a:chOff x="0" y="0"/>
+          <a:chExt cx="0" cy="0"/>
+        </a:xfrm>
+      </p:grpSpPr>
+      <p:sp>
+        <p:nvSpPr>
+          <p:cNvPr id="118" name="Google Shape;118;g18980660da4_0_61:notes"/>
+          <p:cNvSpPr txBox="1"/>
+          <p:nvPr>
+            <p:ph idx="1" type="body"/>
+          </p:nvPr>
+        </p:nvSpPr>
+        <p:spPr>
+          <a:xfrm>
+            <a:off x="685583" y="4400004"/>
+            <a:ext cx="5486700" cy="3601500"/>
+          </a:xfrm>
+          <a:prstGeom prst="rect">
+            <a:avLst/>
+          </a:prstGeom>
+        </p:spPr>
+        <p:txBody>
+          <a:bodyPr anchorCtr="0" anchor="t" bIns="45425" lIns="45425" spcFirstLastPara="1" rIns="45425" wrap="square" tIns="45425">
+            <a:noAutofit/>
+          </a:bodyPr>
+          <a:lstStyle/>
+          <a:p>
+            <a:pPr indent="0" lvl="0" marL="0" rtl="0" algn="l">
+              <a:spcBef>
+                <a:spcPts val="0"/>
+              </a:spcBef>
+              <a:spcAft>
+                <a:spcPts val="0"/>
+              </a:spcAft>
+              <a:buNone/>
+            </a:pPr>
+            <a:r>
+              <a:t/>
+            </a:r>
+            <a:endParaRPr/>
+          </a:p>
+        </p:txBody>
+      </p:sp>
+      <p:sp>
+        <p:nvSpPr>
+          <p:cNvPr id="119" name="Google Shape;119;g18980660da4_0_61:notes"/>
           <p:cNvSpPr/>
           <p:nvPr>
             <p:ph idx="2" type="sldImg"/>
@@ -7131,7 +7231,7 @@
         <p:spPr>
           <a:xfrm>
             <a:off x="645331" y="1501464"/>
-            <a:ext cx="7219800" cy="2691300"/>
+            <a:ext cx="7219800" cy="2845200"/>
           </a:xfrm>
           <a:prstGeom prst="rect">
             <a:avLst/>
@@ -7174,60 +7274,7 @@
                 <a:cs typeface="Montserrat SemiBold"/>
                 <a:sym typeface="Montserrat SemiBold"/>
               </a:rPr>
-              <a:t>A pattern would be a regularity that predictably repeats itself.</a:t>
-            </a:r>
-            <a:endParaRPr sz="1200">
-              <a:solidFill>
-                <a:srgbClr val="FEC52C"/>
-              </a:solidFill>
-              <a:latin typeface="Montserrat SemiBold"/>
-              <a:ea typeface="Montserrat SemiBold"/>
-              <a:cs typeface="Montserrat SemiBold"/>
-              <a:sym typeface="Montserrat SemiBold"/>
-            </a:endParaRPr>
-          </a:p>
-          <a:p>
-            <a:pPr indent="-304800" lvl="0" marL="457200" rtl="0" algn="l">
-              <a:lnSpc>
-                <a:spcPct val="112000"/>
-              </a:lnSpc>
-              <a:spcBef>
-                <a:spcPts val="0"/>
-              </a:spcBef>
-              <a:spcAft>
-                <a:spcPts val="0"/>
-              </a:spcAft>
-              <a:buClr>
-                <a:srgbClr val="FEC52C"/>
-              </a:buClr>
-              <a:buSzPts val="1200"/>
-              <a:buFont typeface="Montserrat SemiBold"/>
-              <a:buChar char="●"/>
-            </a:pPr>
-            <a:r>
-              <a:rPr lang="en-GB" sz="1200">
-                <a:solidFill>
-                  <a:srgbClr val="FEC52C"/>
-                </a:solidFill>
-                <a:latin typeface="Montserrat SemiBold"/>
-                <a:ea typeface="Montserrat SemiBold"/>
-                <a:cs typeface="Montserrat SemiBold"/>
-                <a:sym typeface="Montserrat SemiBold"/>
-              </a:rPr>
-              <a:t>A software design pattern is a reusable solution (template) to commonly occurring issues. - </a:t>
-            </a:r>
-            <a:r>
-              <a:rPr lang="en-GB" sz="1200" u="sng">
-                <a:solidFill>
-                  <a:schemeClr val="hlink"/>
-                </a:solidFill>
-                <a:latin typeface="Montserrat SemiBold"/>
-                <a:ea typeface="Montserrat SemiBold"/>
-                <a:cs typeface="Montserrat SemiBold"/>
-                <a:sym typeface="Montserrat SemiBold"/>
-                <a:hlinkClick r:id="rId4"/>
-              </a:rPr>
-              <a:t>Reference</a:t>
+              <a:t>A software design pattern is a reusable solution (template) to commonly occurring issues.</a:t>
             </a:r>
             <a:endParaRPr sz="1200">
               <a:solidFill>
@@ -7268,6 +7315,46 @@
                 <a:sym typeface="Montserrat SemiBold"/>
               </a:rPr>
               <a:t>A cloud design pattern is the design of an architecture in the cloud that supports the software design pattern.</a:t>
+            </a:r>
+            <a:endParaRPr sz="1200">
+              <a:solidFill>
+                <a:srgbClr val="FEC52C"/>
+              </a:solidFill>
+              <a:latin typeface="Montserrat SemiBold"/>
+              <a:ea typeface="Montserrat SemiBold"/>
+              <a:cs typeface="Montserrat SemiBold"/>
+              <a:sym typeface="Montserrat SemiBold"/>
+            </a:endParaRPr>
+          </a:p>
+          <a:p>
+            <a:pPr indent="-304800" lvl="0" marL="457200" rtl="0" algn="l">
+              <a:lnSpc>
+                <a:spcPct val="112000"/>
+              </a:lnSpc>
+              <a:spcBef>
+                <a:spcPts val="0"/>
+              </a:spcBef>
+              <a:spcAft>
+                <a:spcPts val="0"/>
+              </a:spcAft>
+              <a:buClr>
+                <a:srgbClr val="FEC52C"/>
+              </a:buClr>
+              <a:buSzPts val="1200"/>
+              <a:buFont typeface="Montserrat SemiBold"/>
+              <a:buChar char="●"/>
+            </a:pPr>
+            <a:r>
+              <a:rPr lang="en-GB" sz="1200">
+                <a:solidFill>
+                  <a:srgbClr val="FEC52C"/>
+                </a:solidFill>
+                <a:latin typeface="Montserrat SemiBold"/>
+                <a:ea typeface="Montserrat SemiBold"/>
+                <a:cs typeface="Montserrat SemiBold"/>
+                <a:sym typeface="Montserrat SemiBold"/>
+              </a:rPr>
+              <a:t>Useful for building highly reliable, scalable, secure applications and services within the cloud.</a:t>
             </a:r>
             <a:endParaRPr sz="1200">
               <a:solidFill>
@@ -7411,7 +7498,7 @@
                 <a:cs typeface="Montserrat SemiBold"/>
                 <a:sym typeface="Montserrat SemiBold"/>
               </a:rPr>
-              <a:t> for building the cloud infrastructure to implement the chosen solution.</a:t>
+              <a:t> for building and delivering the cloud infrastructure to implement the chosen solution.</a:t>
             </a:r>
             <a:endParaRPr sz="1200">
               <a:solidFill>
@@ -7424,58 +7511,20 @@
             </a:endParaRPr>
           </a:p>
           <a:p>
-            <a:pPr indent="-304800" lvl="0" marL="457200" rtl="0" algn="l">
+            <a:pPr indent="0" lvl="0" marL="0" rtl="0" algn="l">
               <a:lnSpc>
                 <a:spcPct val="112000"/>
               </a:lnSpc>
               <a:spcBef>
-                <a:spcPts val="0"/>
-              </a:spcBef>
-              <a:spcAft>
-                <a:spcPts val="0"/>
-              </a:spcAft>
-              <a:buClr>
-                <a:srgbClr val="FEC52C"/>
-              </a:buClr>
-              <a:buSzPts val="1200"/>
-              <a:buFont typeface="Montserrat SemiBold"/>
-              <a:buChar char="●"/>
+                <a:spcPts val="1200"/>
+              </a:spcBef>
+              <a:spcAft>
+                <a:spcPts val="0"/>
+              </a:spcAft>
+              <a:buNone/>
             </a:pPr>
             <a:r>
-              <a:rPr lang="en-GB" sz="1200">
-                <a:solidFill>
-                  <a:srgbClr val="FEC52C"/>
-                </a:solidFill>
-                <a:latin typeface="Montserrat SemiBold"/>
-                <a:ea typeface="Montserrat SemiBold"/>
-                <a:cs typeface="Montserrat SemiBold"/>
-                <a:sym typeface="Montserrat SemiBold"/>
-              </a:rPr>
-              <a:t>Design patterns need scalable, reliable and </a:t>
-            </a:r>
-            <a:r>
-              <a:rPr lang="en-GB" sz="1200">
-                <a:solidFill>
-                  <a:srgbClr val="FEC52C"/>
-                </a:solidFill>
-                <a:latin typeface="Montserrat SemiBold"/>
-                <a:ea typeface="Montserrat SemiBold"/>
-                <a:cs typeface="Montserrat SemiBold"/>
-                <a:sym typeface="Montserrat SemiBold"/>
-              </a:rPr>
-              <a:t>dynamic</a:t>
-            </a:r>
-            <a:r>
-              <a:rPr lang="en-GB" sz="1200">
-                <a:solidFill>
-                  <a:srgbClr val="FEC52C"/>
-                </a:solidFill>
-                <a:latin typeface="Montserrat SemiBold"/>
-                <a:ea typeface="Montserrat SemiBold"/>
-                <a:cs typeface="Montserrat SemiBold"/>
-                <a:sym typeface="Montserrat SemiBold"/>
-              </a:rPr>
-              <a:t> infrastructure which is why the cloud is perfect for software with complex design patterns!</a:t>
+              <a:t/>
             </a:r>
             <a:endParaRPr sz="1200">
               <a:solidFill>
@@ -7623,8 +7672,8 @@
         </p:nvSpPr>
         <p:spPr>
           <a:xfrm>
-            <a:off x="645331" y="1501464"/>
-            <a:ext cx="7219800" cy="2328000"/>
+            <a:off x="645324" y="1501475"/>
+            <a:ext cx="7927200" cy="2174100"/>
           </a:xfrm>
           <a:prstGeom prst="rect">
             <a:avLst/>
@@ -7840,20 +7889,47 @@
             </a:endParaRPr>
           </a:p>
           <a:p>
-            <a:pPr indent="0" lvl="0" marL="0" rtl="0" algn="l">
+            <a:pPr indent="-336550" lvl="0" marL="457200" rtl="0" algn="l">
               <a:lnSpc>
                 <a:spcPct val="112000"/>
               </a:lnSpc>
               <a:spcBef>
-                <a:spcPts val="1200"/>
-              </a:spcBef>
-              <a:spcAft>
-                <a:spcPts val="0"/>
-              </a:spcAft>
-              <a:buNone/>
+                <a:spcPts val="0"/>
+              </a:spcBef>
+              <a:spcAft>
+                <a:spcPts val="0"/>
+              </a:spcAft>
+              <a:buClr>
+                <a:srgbClr val="FEC52C"/>
+              </a:buClr>
+              <a:buSzPts val="1700"/>
+              <a:buFont typeface="Montserrat SemiBold"/>
+              <a:buChar char="●"/>
             </a:pPr>
             <a:r>
-              <a:t/>
+              <a:rPr lang="en-GB" sz="1700" u="sng">
+                <a:solidFill>
+                  <a:schemeClr val="hlink"/>
+                </a:solidFill>
+                <a:latin typeface="Montserrat SemiBold"/>
+                <a:ea typeface="Montserrat SemiBold"/>
+                <a:cs typeface="Montserrat SemiBold"/>
+                <a:sym typeface="Montserrat SemiBold"/>
+                <a:hlinkClick r:id="rId4"/>
+              </a:rPr>
+              <a:t>https://learn.microsoft.com/en-us/azure/architecture/patterns/</a:t>
+            </a:r>
+            <a:r>
+              <a:rPr lang="en-GB" sz="1700">
+                <a:solidFill>
+                  <a:srgbClr val="FEC52C"/>
+                </a:solidFill>
+                <a:latin typeface="Montserrat SemiBold"/>
+                <a:ea typeface="Montserrat SemiBold"/>
+                <a:cs typeface="Montserrat SemiBold"/>
+                <a:sym typeface="Montserrat SemiBold"/>
+              </a:rPr>
+              <a:t> </a:t>
             </a:r>
             <a:endParaRPr sz="1700">
               <a:solidFill>
@@ -8002,7 +8078,7 @@
         <p:spPr>
           <a:xfrm>
             <a:off x="645331" y="1501464"/>
-            <a:ext cx="7219800" cy="2552100"/>
+            <a:ext cx="7219800" cy="2337900"/>
           </a:xfrm>
           <a:prstGeom prst="rect">
             <a:avLst/>
@@ -8018,7 +8094,7 @@
           </a:bodyPr>
           <a:lstStyle/>
           <a:p>
-            <a:pPr indent="-317500" lvl="0" marL="457200" rtl="0" algn="l">
+            <a:pPr indent="-311150" lvl="0" marL="457200" rtl="0" algn="l">
               <a:lnSpc>
                 <a:spcPct val="112000"/>
               </a:lnSpc>
@@ -8031,12 +8107,12 @@
               <a:buClr>
                 <a:srgbClr val="FEC52C"/>
               </a:buClr>
-              <a:buSzPts val="1400"/>
+              <a:buSzPts val="1300"/>
               <a:buFont typeface="Montserrat SemiBold"/>
               <a:buChar char="●"/>
             </a:pPr>
             <a:r>
-              <a:rPr lang="en-GB">
+              <a:rPr lang="en-GB" sz="1300">
                 <a:solidFill>
                   <a:srgbClr val="FEC52C"/>
                 </a:solidFill>
@@ -8047,7 +8123,7 @@
               </a:rPr>
               <a:t>Simple pattern to ensure that if one element fails, others will continue to function. Isolate failures, build resiliency and respond to failure.</a:t>
             </a:r>
-            <a:endParaRPr>
+            <a:endParaRPr sz="1300">
               <a:solidFill>
                 <a:srgbClr val="FEC52C"/>
               </a:solidFill>
@@ -8058,7 +8134,7 @@
             </a:endParaRPr>
           </a:p>
           <a:p>
-            <a:pPr indent="-317500" lvl="0" marL="457200" rtl="0" algn="l">
+            <a:pPr indent="-311150" lvl="0" marL="457200" rtl="0" algn="l">
               <a:lnSpc>
                 <a:spcPct val="112000"/>
               </a:lnSpc>
@@ -8071,12 +8147,12 @@
               <a:buClr>
                 <a:srgbClr val="FEC52C"/>
               </a:buClr>
-              <a:buSzPts val="1400"/>
+              <a:buSzPts val="1300"/>
               <a:buFont typeface="Montserrat SemiBold"/>
               <a:buChar char="●"/>
             </a:pPr>
             <a:r>
-              <a:rPr lang="en-GB">
+              <a:rPr lang="en-GB" sz="1300">
                 <a:solidFill>
                   <a:srgbClr val="FEC52C"/>
                 </a:solidFill>
@@ -8087,7 +8163,7 @@
               </a:rPr>
               <a:t>Applications that can operate in “offline mode” are good examples of the bulkhead pattern. Cache external API data.</a:t>
             </a:r>
-            <a:endParaRPr>
+            <a:endParaRPr sz="1300">
               <a:solidFill>
                 <a:srgbClr val="FEC52C"/>
               </a:solidFill>
@@ -8098,7 +8174,7 @@
             </a:endParaRPr>
           </a:p>
           <a:p>
-            <a:pPr indent="-317500" lvl="0" marL="457200" rtl="0" algn="l">
+            <a:pPr indent="-311150" lvl="0" marL="457200" rtl="0" algn="l">
               <a:lnSpc>
                 <a:spcPct val="112000"/>
               </a:lnSpc>
@@ -8111,12 +8187,12 @@
               <a:buClr>
                 <a:srgbClr val="FEC52C"/>
               </a:buClr>
-              <a:buSzPts val="1400"/>
+              <a:buSzPts val="1300"/>
               <a:buFont typeface="Montserrat SemiBold"/>
               <a:buChar char="●"/>
             </a:pPr>
             <a:r>
-              <a:rPr lang="en-GB">
+              <a:rPr lang="en-GB" sz="1300">
                 <a:solidFill>
                   <a:srgbClr val="FEC52C"/>
                 </a:solidFill>
@@ -8127,7 +8203,7 @@
               </a:rPr>
               <a:t>Use PaaS or serverless to respond to failure and scale resources.</a:t>
             </a:r>
-            <a:endParaRPr>
+            <a:endParaRPr sz="1300">
               <a:solidFill>
                 <a:srgbClr val="FEC52C"/>
               </a:solidFill>
@@ -8138,7 +8214,7 @@
             </a:endParaRPr>
           </a:p>
           <a:p>
-            <a:pPr indent="-317500" lvl="0" marL="457200" rtl="0" algn="l">
+            <a:pPr indent="-311150" lvl="0" marL="457200" rtl="0" algn="l">
               <a:lnSpc>
                 <a:spcPct val="112000"/>
               </a:lnSpc>
@@ -8151,12 +8227,12 @@
               <a:buClr>
                 <a:srgbClr val="FEC52C"/>
               </a:buClr>
-              <a:buSzPts val="1400"/>
+              <a:buSzPts val="1300"/>
               <a:buFont typeface="Montserrat SemiBold"/>
               <a:buChar char="●"/>
             </a:pPr>
             <a:r>
-              <a:rPr lang="en-GB">
+              <a:rPr lang="en-GB" sz="1300">
                 <a:solidFill>
                   <a:srgbClr val="FEC52C"/>
                 </a:solidFill>
@@ -8167,7 +8243,7 @@
               </a:rPr>
               <a:t>Cloud providers use availability zones and regions to provide further resiliency.</a:t>
             </a:r>
-            <a:endParaRPr>
+            <a:endParaRPr sz="1300">
               <a:solidFill>
                 <a:srgbClr val="FEC52C"/>
               </a:solidFill>
@@ -8193,7 +8269,7 @@
             <a:r>
               <a:t/>
             </a:r>
-            <a:endParaRPr sz="1700">
+            <a:endParaRPr sz="2100">
               <a:solidFill>
                 <a:srgbClr val="FEC52C"/>
               </a:solidFill>
@@ -8219,7 +8295,7 @@
             <a:r>
               <a:t/>
             </a:r>
-            <a:endParaRPr sz="1700">
+            <a:endParaRPr sz="2100">
               <a:solidFill>
                 <a:srgbClr val="FEC52C"/>
               </a:solidFill>
@@ -8237,18 +8313,17 @@
           <p:cNvPicPr preferRelativeResize="0"/>
           <p:nvPr/>
         </p:nvPicPr>
-        <p:blipFill>
+        <p:blipFill rotWithShape="1">
           <a:blip r:embed="rId4">
             <a:alphaModFix/>
           </a:blip>
-          <a:stretch>
-            <a:fillRect/>
-          </a:stretch>
+          <a:srcRect b="17120" l="9143" r="9217" t="36967"/>
+          <a:stretch/>
         </p:blipFill>
         <p:spPr>
           <a:xfrm>
-            <a:off x="3805075" y="2945575"/>
-            <a:ext cx="4734750" cy="1988600"/>
+            <a:off x="1135675" y="3062650"/>
+            <a:ext cx="6390099" cy="1509325"/>
           </a:xfrm>
           <a:prstGeom prst="rect">
             <a:avLst/>
@@ -8368,7 +8443,7 @@
         <p:spPr>
           <a:xfrm>
             <a:off x="645331" y="1501464"/>
-            <a:ext cx="7219800" cy="1827900"/>
+            <a:ext cx="7219800" cy="1758900"/>
           </a:xfrm>
           <a:prstGeom prst="rect">
             <a:avLst/>
@@ -8384,7 +8459,7 @@
           </a:bodyPr>
           <a:lstStyle/>
           <a:p>
-            <a:pPr indent="-317500" lvl="0" marL="457200" rtl="0" algn="l">
+            <a:pPr indent="-311150" lvl="0" marL="457200" rtl="0" algn="l">
               <a:lnSpc>
                 <a:spcPct val="112000"/>
               </a:lnSpc>
@@ -8397,12 +8472,12 @@
               <a:buClr>
                 <a:srgbClr val="FEC52C"/>
               </a:buClr>
-              <a:buSzPts val="1400"/>
+              <a:buSzPts val="1300"/>
               <a:buFont typeface="Montserrat SemiBold"/>
               <a:buChar char="●"/>
             </a:pPr>
             <a:r>
-              <a:rPr lang="en-GB">
+              <a:rPr lang="en-GB" sz="1300">
                 <a:solidFill>
                   <a:srgbClr val="FEC52C"/>
                 </a:solidFill>
@@ -8413,7 +8488,7 @@
               </a:rPr>
               <a:t>Simple pattern to ensure failed requests are re-sent.</a:t>
             </a:r>
-            <a:endParaRPr>
+            <a:endParaRPr sz="1300">
               <a:solidFill>
                 <a:srgbClr val="FEC52C"/>
               </a:solidFill>
@@ -8424,7 +8499,7 @@
             </a:endParaRPr>
           </a:p>
           <a:p>
-            <a:pPr indent="-317500" lvl="0" marL="457200" rtl="0" algn="l">
+            <a:pPr indent="-311150" lvl="0" marL="457200" rtl="0" algn="l">
               <a:lnSpc>
                 <a:spcPct val="112000"/>
               </a:lnSpc>
@@ -8437,12 +8512,12 @@
               <a:buClr>
                 <a:srgbClr val="FEC52C"/>
               </a:buClr>
-              <a:buSzPts val="1400"/>
+              <a:buSzPts val="1300"/>
               <a:buFont typeface="Montserrat SemiBold"/>
               <a:buChar char="●"/>
             </a:pPr>
             <a:r>
-              <a:rPr lang="en-GB">
+              <a:rPr lang="en-GB" sz="1300">
                 <a:solidFill>
                   <a:srgbClr val="FEC52C"/>
                 </a:solidFill>
@@ -8453,7 +8528,7 @@
               </a:rPr>
               <a:t>Common cloud design pattern to deal with third-party interactions and expect failures.</a:t>
             </a:r>
-            <a:endParaRPr>
+            <a:endParaRPr sz="1300">
               <a:solidFill>
                 <a:srgbClr val="FEC52C"/>
               </a:solidFill>
@@ -8464,7 +8539,7 @@
             </a:endParaRPr>
           </a:p>
           <a:p>
-            <a:pPr indent="-317500" lvl="0" marL="457200" rtl="0" algn="l">
+            <a:pPr indent="-311150" lvl="0" marL="457200" rtl="0" algn="l">
               <a:lnSpc>
                 <a:spcPct val="112000"/>
               </a:lnSpc>
@@ -8477,12 +8552,12 @@
               <a:buClr>
                 <a:srgbClr val="FEC52C"/>
               </a:buClr>
-              <a:buSzPts val="1400"/>
+              <a:buSzPts val="1300"/>
               <a:buFont typeface="Montserrat SemiBold"/>
               <a:buChar char="●"/>
             </a:pPr>
             <a:r>
-              <a:rPr lang="en-GB">
+              <a:rPr lang="en-GB" sz="1300">
                 <a:solidFill>
                   <a:srgbClr val="FEC52C"/>
                 </a:solidFill>
@@ -8493,7 +8568,7 @@
               </a:rPr>
               <a:t>Works only if sender and receiver support retries.</a:t>
             </a:r>
-            <a:endParaRPr>
+            <a:endParaRPr sz="1300">
               <a:solidFill>
                 <a:srgbClr val="FEC52C"/>
               </a:solidFill>
@@ -8563,18 +8638,17 @@
           <p:cNvPicPr preferRelativeResize="0"/>
           <p:nvPr/>
         </p:nvPicPr>
-        <p:blipFill>
+        <p:blipFill rotWithShape="1">
           <a:blip r:embed="rId4">
             <a:alphaModFix/>
           </a:blip>
-          <a:stretch>
-            <a:fillRect/>
-          </a:stretch>
+          <a:srcRect b="18459" l="10643" r="9751" t="33493"/>
+          <a:stretch/>
         </p:blipFill>
         <p:spPr>
           <a:xfrm>
-            <a:off x="3510750" y="2482475"/>
-            <a:ext cx="4918500" cy="2410050"/>
+            <a:off x="1143000" y="2571750"/>
+            <a:ext cx="6490749" cy="1919649"/>
           </a:xfrm>
           <a:prstGeom prst="rect">
             <a:avLst/>
@@ -8694,7 +8768,7 @@
         <p:spPr>
           <a:xfrm>
             <a:off x="645331" y="1501464"/>
-            <a:ext cx="7219800" cy="2069400"/>
+            <a:ext cx="7219800" cy="1852500"/>
           </a:xfrm>
           <a:prstGeom prst="rect">
             <a:avLst/>
@@ -8710,7 +8784,7 @@
           </a:bodyPr>
           <a:lstStyle/>
           <a:p>
-            <a:pPr indent="-317500" lvl="0" marL="457200" rtl="0" algn="l">
+            <a:pPr indent="-311150" lvl="0" marL="457200" rtl="0" algn="l">
               <a:lnSpc>
                 <a:spcPct val="112000"/>
               </a:lnSpc>
@@ -8723,12 +8797,12 @@
               <a:buClr>
                 <a:srgbClr val="FEC52C"/>
               </a:buClr>
-              <a:buSzPts val="1400"/>
+              <a:buSzPts val="1300"/>
               <a:buFont typeface="Montserrat SemiBold"/>
               <a:buChar char="●"/>
             </a:pPr>
             <a:r>
-              <a:rPr lang="en-GB">
+              <a:rPr lang="en-GB" sz="1300">
                 <a:solidFill>
                   <a:srgbClr val="FEC52C"/>
                 </a:solidFill>
@@ -8740,7 +8814,7 @@
               <a:t>Set and force limits on how frequent a single client can use a service or </a:t>
             </a:r>
             <a:r>
-              <a:rPr lang="en-GB">
+              <a:rPr lang="en-GB" sz="1300">
                 <a:solidFill>
                   <a:srgbClr val="FEC52C"/>
                 </a:solidFill>
@@ -8752,7 +8826,7 @@
               <a:t>endpoint</a:t>
             </a:r>
             <a:r>
-              <a:rPr lang="en-GB">
+              <a:rPr lang="en-GB" sz="1300">
                 <a:solidFill>
                   <a:srgbClr val="FEC52C"/>
                 </a:solidFill>
@@ -8763,7 +8837,7 @@
               </a:rPr>
               <a:t> to keep one “noisy neighbour” from negatively impacting the application for everyone.</a:t>
             </a:r>
-            <a:endParaRPr>
+            <a:endParaRPr sz="1300">
               <a:solidFill>
                 <a:srgbClr val="FEC52C"/>
               </a:solidFill>
@@ -8774,7 +8848,7 @@
             </a:endParaRPr>
           </a:p>
           <a:p>
-            <a:pPr indent="-317500" lvl="0" marL="457200" rtl="0" algn="l">
+            <a:pPr indent="-311150" lvl="0" marL="457200" rtl="0" algn="l">
               <a:lnSpc>
                 <a:spcPct val="112000"/>
               </a:lnSpc>
@@ -8787,12 +8861,12 @@
               <a:buClr>
                 <a:srgbClr val="FEC52C"/>
               </a:buClr>
-              <a:buSzPts val="1400"/>
+              <a:buSzPts val="1300"/>
               <a:buFont typeface="Montserrat SemiBold"/>
               <a:buChar char="●"/>
             </a:pPr>
             <a:r>
-              <a:rPr lang="en-GB">
+              <a:rPr lang="en-GB" sz="1300">
                 <a:solidFill>
                   <a:srgbClr val="FEC52C"/>
                 </a:solidFill>
@@ -8803,7 +8877,7 @@
               </a:rPr>
               <a:t>Most cloud based services that support APIs/HTTPS requests will have some sort of throttling.</a:t>
             </a:r>
-            <a:endParaRPr>
+            <a:endParaRPr sz="1300">
               <a:solidFill>
                 <a:srgbClr val="FEC52C"/>
               </a:solidFill>
@@ -8829,7 +8903,7 @@
             <a:r>
               <a:t/>
             </a:r>
-            <a:endParaRPr sz="1700">
+            <a:endParaRPr sz="1300">
               <a:solidFill>
                 <a:srgbClr val="FEC52C"/>
               </a:solidFill>
@@ -8855,7 +8929,7 @@
             <a:r>
               <a:t/>
             </a:r>
-            <a:endParaRPr sz="1700">
+            <a:endParaRPr sz="1300">
               <a:solidFill>
                 <a:srgbClr val="FEC52C"/>
               </a:solidFill>
@@ -8873,18 +8947,17 @@
           <p:cNvPicPr preferRelativeResize="0"/>
           <p:nvPr/>
         </p:nvPicPr>
-        <p:blipFill>
+        <p:blipFill rotWithShape="1">
           <a:blip r:embed="rId4">
             <a:alphaModFix/>
           </a:blip>
-          <a:stretch>
-            <a:fillRect/>
-          </a:stretch>
+          <a:srcRect b="15479" l="9860" r="9246" t="34939"/>
+          <a:stretch/>
         </p:blipFill>
         <p:spPr>
           <a:xfrm>
-            <a:off x="3531775" y="2571755"/>
-            <a:ext cx="4981551" cy="2391124"/>
+            <a:off x="1099050" y="2718300"/>
+            <a:ext cx="6450000" cy="1897651"/>
           </a:xfrm>
           <a:prstGeom prst="rect">
             <a:avLst/>
@@ -9004,7 +9077,7 @@
         <p:spPr>
           <a:xfrm>
             <a:off x="645331" y="1501464"/>
-            <a:ext cx="7219800" cy="2069400"/>
+            <a:ext cx="7219800" cy="1758900"/>
           </a:xfrm>
           <a:prstGeom prst="rect">
             <a:avLst/>
@@ -9020,7 +9093,7 @@
           </a:bodyPr>
           <a:lstStyle/>
           <a:p>
-            <a:pPr indent="-317500" lvl="0" marL="457200" rtl="0" algn="l">
+            <a:pPr indent="-311150" lvl="0" marL="457200" rtl="0" algn="l">
               <a:lnSpc>
                 <a:spcPct val="112000"/>
               </a:lnSpc>
@@ -9033,12 +9106,12 @@
               <a:buClr>
                 <a:srgbClr val="FEC52C"/>
               </a:buClr>
-              <a:buSzPts val="1400"/>
+              <a:buSzPts val="1300"/>
               <a:buFont typeface="Montserrat SemiBold"/>
               <a:buChar char="●"/>
             </a:pPr>
             <a:r>
-              <a:rPr lang="en-GB">
+              <a:rPr lang="en-GB" sz="1300">
                 <a:solidFill>
                   <a:srgbClr val="FEC52C"/>
                 </a:solidFill>
@@ -9050,7 +9123,7 @@
               <a:t>Common cloud design </a:t>
             </a:r>
             <a:r>
-              <a:rPr lang="en-GB">
+              <a:rPr lang="en-GB" sz="1300">
                 <a:solidFill>
                   <a:srgbClr val="FEC52C"/>
                 </a:solidFill>
@@ -9062,7 +9135,7 @@
               <a:t>pattern</a:t>
             </a:r>
             <a:r>
-              <a:rPr lang="en-GB">
+              <a:rPr lang="en-GB" sz="1300">
                 <a:solidFill>
                   <a:srgbClr val="FEC52C"/>
                 </a:solidFill>
@@ -9074,7 +9147,7 @@
               <a:t> to help with scaling as an </a:t>
             </a:r>
             <a:r>
-              <a:rPr lang="en-GB">
+              <a:rPr lang="en-GB" sz="1300">
                 <a:solidFill>
                   <a:srgbClr val="FEC52C"/>
                 </a:solidFill>
@@ -9086,7 +9159,7 @@
               <a:t>application</a:t>
             </a:r>
             <a:r>
-              <a:rPr lang="en-GB">
+              <a:rPr lang="en-GB" sz="1300">
                 <a:solidFill>
                   <a:srgbClr val="FEC52C"/>
                 </a:solidFill>
@@ -9097,7 +9170,7 @@
               </a:rPr>
               <a:t> grows.</a:t>
             </a:r>
-            <a:endParaRPr>
+            <a:endParaRPr sz="1300">
               <a:solidFill>
                 <a:srgbClr val="FEC52C"/>
               </a:solidFill>
@@ -9108,7 +9181,7 @@
             </a:endParaRPr>
           </a:p>
           <a:p>
-            <a:pPr indent="-317500" lvl="0" marL="457200" rtl="0" algn="l">
+            <a:pPr indent="-311150" lvl="0" marL="457200" rtl="0" algn="l">
               <a:lnSpc>
                 <a:spcPct val="112000"/>
               </a:lnSpc>
@@ -9121,12 +9194,12 @@
               <a:buClr>
                 <a:srgbClr val="FEC52C"/>
               </a:buClr>
-              <a:buSzPts val="1400"/>
+              <a:buSzPts val="1300"/>
               <a:buFont typeface="Montserrat SemiBold"/>
               <a:buChar char="●"/>
             </a:pPr>
             <a:r>
-              <a:rPr lang="en-GB">
+              <a:rPr lang="en-GB" sz="1300">
                 <a:solidFill>
                   <a:srgbClr val="FEC52C"/>
                 </a:solidFill>
@@ -9137,7 +9210,7 @@
               </a:rPr>
               <a:t>Rather than process a request on delivery, queue the intended operation. Good for applications that don’t need immediate results such as sending emails or calculating values.</a:t>
             </a:r>
-            <a:endParaRPr>
+            <a:endParaRPr sz="1300">
               <a:solidFill>
                 <a:srgbClr val="FEC52C"/>
               </a:solidFill>
@@ -9207,18 +9280,17 @@
           <p:cNvPicPr preferRelativeResize="0"/>
           <p:nvPr/>
         </p:nvPicPr>
-        <p:blipFill>
+        <p:blipFill rotWithShape="1">
           <a:blip r:embed="rId4">
             <a:alphaModFix/>
           </a:blip>
-          <a:stretch>
-            <a:fillRect/>
-          </a:stretch>
+          <a:srcRect b="17264" l="10561" r="8004" t="37765"/>
+          <a:stretch/>
         </p:blipFill>
         <p:spPr>
           <a:xfrm>
-            <a:off x="3426650" y="2723427"/>
-            <a:ext cx="5023599" cy="2210376"/>
+            <a:off x="1106375" y="2476475"/>
+            <a:ext cx="6965751" cy="1692550"/>
           </a:xfrm>
           <a:prstGeom prst="rect">
             <a:avLst/>
@@ -9323,6 +9395,252 @@
             </a:pPr>
             <a:r>
               <a:rPr lang="en-GB" sz="3100"/>
+              <a:t>Queue-based Load Levelling</a:t>
+            </a:r>
+            <a:endParaRPr sz="3400"/>
+          </a:p>
+        </p:txBody>
+      </p:sp>
+      <p:sp>
+        <p:nvSpPr>
+          <p:cNvPr id="115" name="Google Shape;115;p21"/>
+          <p:cNvSpPr txBox="1"/>
+          <p:nvPr/>
+        </p:nvSpPr>
+        <p:spPr>
+          <a:xfrm>
+            <a:off x="645331" y="1501464"/>
+            <a:ext cx="7219800" cy="1224600"/>
+          </a:xfrm>
+          <a:prstGeom prst="rect">
+            <a:avLst/>
+          </a:prstGeom>
+          <a:noFill/>
+          <a:ln>
+            <a:noFill/>
+          </a:ln>
+        </p:spPr>
+        <p:txBody>
+          <a:bodyPr anchorCtr="0" anchor="t" bIns="0" lIns="0" spcFirstLastPara="1" rIns="0" wrap="square" tIns="0">
+            <a:spAutoFit/>
+          </a:bodyPr>
+          <a:lstStyle/>
+          <a:p>
+            <a:pPr indent="-361950" lvl="0" marL="457200" rtl="0" algn="l">
+              <a:lnSpc>
+                <a:spcPct val="112000"/>
+              </a:lnSpc>
+              <a:spcBef>
+                <a:spcPts val="0"/>
+              </a:spcBef>
+              <a:spcAft>
+                <a:spcPts val="0"/>
+              </a:spcAft>
+              <a:buClr>
+                <a:srgbClr val="FEC52C"/>
+              </a:buClr>
+              <a:buSzPts val="2100"/>
+              <a:buFont typeface="Montserrat SemiBold"/>
+              <a:buChar char="●"/>
+            </a:pPr>
+            <a:r>
+              <a:rPr lang="en-GB" sz="2100">
+                <a:solidFill>
+                  <a:srgbClr val="FEC52C"/>
+                </a:solidFill>
+                <a:latin typeface="Montserrat SemiBold"/>
+                <a:ea typeface="Montserrat SemiBold"/>
+                <a:cs typeface="Montserrat SemiBold"/>
+                <a:sym typeface="Montserrat SemiBold"/>
+              </a:rPr>
+              <a:t>DEMO</a:t>
+            </a:r>
+            <a:endParaRPr sz="2400">
+              <a:solidFill>
+                <a:srgbClr val="FEC52C"/>
+              </a:solidFill>
+              <a:latin typeface="Montserrat SemiBold"/>
+              <a:ea typeface="Montserrat SemiBold"/>
+              <a:cs typeface="Montserrat SemiBold"/>
+              <a:sym typeface="Montserrat SemiBold"/>
+            </a:endParaRPr>
+          </a:p>
+          <a:p>
+            <a:pPr indent="0" lvl="0" marL="0" rtl="0" algn="l">
+              <a:lnSpc>
+                <a:spcPct val="112000"/>
+              </a:lnSpc>
+              <a:spcBef>
+                <a:spcPts val="1200"/>
+              </a:spcBef>
+              <a:spcAft>
+                <a:spcPts val="0"/>
+              </a:spcAft>
+              <a:buNone/>
+            </a:pPr>
+            <a:r>
+              <a:t/>
+            </a:r>
+            <a:endParaRPr sz="1700">
+              <a:solidFill>
+                <a:srgbClr val="FEC52C"/>
+              </a:solidFill>
+              <a:latin typeface="Montserrat SemiBold"/>
+              <a:ea typeface="Montserrat SemiBold"/>
+              <a:cs typeface="Montserrat SemiBold"/>
+              <a:sym typeface="Montserrat SemiBold"/>
+            </a:endParaRPr>
+          </a:p>
+          <a:p>
+            <a:pPr indent="0" lvl="0" marL="0" rtl="0" algn="l">
+              <a:lnSpc>
+                <a:spcPct val="112000"/>
+              </a:lnSpc>
+              <a:spcBef>
+                <a:spcPts val="1200"/>
+              </a:spcBef>
+              <a:spcAft>
+                <a:spcPts val="1200"/>
+              </a:spcAft>
+              <a:buNone/>
+            </a:pPr>
+            <a:r>
+              <a:t/>
+            </a:r>
+            <a:endParaRPr sz="1700">
+              <a:solidFill>
+                <a:srgbClr val="FEC52C"/>
+              </a:solidFill>
+              <a:latin typeface="Montserrat SemiBold"/>
+              <a:ea typeface="Montserrat SemiBold"/>
+              <a:cs typeface="Montserrat SemiBold"/>
+              <a:sym typeface="Montserrat SemiBold"/>
+            </a:endParaRPr>
+          </a:p>
+        </p:txBody>
+      </p:sp>
+      <p:pic>
+        <p:nvPicPr>
+          <p:cNvPr id="116" name="Google Shape;116;p21"/>
+          <p:cNvPicPr preferRelativeResize="0"/>
+          <p:nvPr/>
+        </p:nvPicPr>
+        <p:blipFill>
+          <a:blip r:embed="rId4">
+            <a:alphaModFix/>
+          </a:blip>
+          <a:stretch>
+            <a:fillRect/>
+          </a:stretch>
+        </p:blipFill>
+        <p:spPr>
+          <a:xfrm>
+            <a:off x="1097575" y="1947939"/>
+            <a:ext cx="4074966" cy="2112636"/>
+          </a:xfrm>
+          <a:prstGeom prst="rect">
+            <a:avLst/>
+          </a:prstGeom>
+          <a:noFill/>
+          <a:ln>
+            <a:noFill/>
+          </a:ln>
+        </p:spPr>
+      </p:pic>
+    </p:spTree>
+  </p:cSld>
+  <p:clrMapOvr>
+    <a:masterClrMapping/>
+  </p:clrMapOvr>
+</p:sld>
+</file>
+
+<file path=ppt/slides/slide9.xml><?xml version="1.0" encoding="utf-8"?>
+<p:sld xmlns:a="http://schemas.openxmlformats.org/drawingml/2006/main" xmlns:r="http://schemas.openxmlformats.org/officeDocument/2006/relationships" xmlns:mc="http://schemas.openxmlformats.org/markup-compatibility/2006" xmlns:mv="urn:schemas-microsoft-com:mac:vml" xmlns:p="http://schemas.openxmlformats.org/presentationml/2006/main" xmlns:c="http://schemas.openxmlformats.org/drawingml/2006/chart" xmlns:dgm="http://schemas.openxmlformats.org/drawingml/2006/diagram" xmlns:o="urn:schemas-microsoft-com:office:office" xmlns:v="urn:schemas-microsoft-com:vml" xmlns:pvml="urn:schemas-microsoft-com:office:powerpoint" xmlns:com="http://schemas.openxmlformats.org/drawingml/2006/compatibility" xmlns:p14="http://schemas.microsoft.com/office/powerpoint/2010/main" xmlns:p15="http://schemas.microsoft.com/office/powerpoint/2012/main" xmlns:ahyp="http://schemas.microsoft.com/office/drawing/2018/hyperlinkcolor">
+  <p:cSld>
+    <p:spTree>
+      <p:nvGrpSpPr>
+        <p:cNvPr id="120" name="Shape 120"/>
+        <p:cNvGrpSpPr/>
+        <p:nvPr/>
+      </p:nvGrpSpPr>
+      <p:grpSpPr>
+        <a:xfrm>
+          <a:off x="0" y="0"/>
+          <a:ext cx="0" cy="0"/>
+          <a:chOff x="0" y="0"/>
+          <a:chExt cx="0" cy="0"/>
+        </a:xfrm>
+      </p:grpSpPr>
+      <p:pic>
+        <p:nvPicPr>
+          <p:cNvPr id="121" name="Google Shape;121;p22"/>
+          <p:cNvPicPr preferRelativeResize="0"/>
+          <p:nvPr/>
+        </p:nvPicPr>
+        <p:blipFill rotWithShape="1">
+          <a:blip r:embed="rId3">
+            <a:alphaModFix/>
+          </a:blip>
+          <a:srcRect b="0" l="0" r="0" t="0"/>
+          <a:stretch/>
+        </p:blipFill>
+        <p:spPr>
+          <a:xfrm>
+            <a:off x="7838806" y="180500"/>
+            <a:ext cx="1133641" cy="218825"/>
+          </a:xfrm>
+          <a:prstGeom prst="rect">
+            <a:avLst/>
+          </a:prstGeom>
+          <a:noFill/>
+          <a:ln>
+            <a:noFill/>
+          </a:ln>
+        </p:spPr>
+      </p:pic>
+      <p:sp>
+        <p:nvSpPr>
+          <p:cNvPr id="122" name="Google Shape;122;p22"/>
+          <p:cNvSpPr txBox="1"/>
+          <p:nvPr>
+            <p:ph idx="1" type="body"/>
+          </p:nvPr>
+        </p:nvSpPr>
+        <p:spPr>
+          <a:xfrm>
+            <a:off x="645325" y="711750"/>
+            <a:ext cx="8220300" cy="477300"/>
+          </a:xfrm>
+          <a:prstGeom prst="rect">
+            <a:avLst/>
+          </a:prstGeom>
+          <a:noFill/>
+          <a:ln>
+            <a:noFill/>
+          </a:ln>
+        </p:spPr>
+        <p:txBody>
+          <a:bodyPr anchorCtr="0" anchor="t" bIns="0" lIns="0" spcFirstLastPara="1" rIns="0" wrap="square" tIns="0">
+            <a:spAutoFit/>
+          </a:bodyPr>
+          <a:lstStyle/>
+          <a:p>
+            <a:pPr indent="0" lvl="0" marL="0" rtl="0" algn="l">
+              <a:lnSpc>
+                <a:spcPct val="112000"/>
+              </a:lnSpc>
+              <a:spcBef>
+                <a:spcPts val="0"/>
+              </a:spcBef>
+              <a:spcAft>
+                <a:spcPts val="1200"/>
+              </a:spcAft>
+              <a:buSzPts val="1100"/>
+              <a:buNone/>
+            </a:pPr>
+            <a:r>
+              <a:rPr lang="en-GB" sz="3100"/>
               <a:t>More Reading</a:t>
             </a:r>
             <a:endParaRPr sz="3400"/>
@@ -9331,7 +9649,7 @@
       </p:sp>
       <p:sp>
         <p:nvSpPr>
-          <p:cNvPr id="115" name="Google Shape;115;p21"/>
+          <p:cNvPr id="123" name="Google Shape;123;p22"/>
           <p:cNvSpPr txBox="1"/>
           <p:nvPr/>
         </p:nvSpPr>
@@ -9563,6 +9881,285 @@
 </file>
 
 <file path=ppt/theme/theme1.xml><?xml version="1.0" encoding="utf-8"?>
+<a:theme xmlns:a="http://schemas.openxmlformats.org/drawingml/2006/main" xmlns:r="http://schemas.openxmlformats.org/officeDocument/2006/relationships">
+  <a:themeElements>
+    <a:clrScheme name="Default">
+      <a:dk1>
+        <a:srgbClr val="000000"/>
+      </a:dk1>
+      <a:lt1>
+        <a:srgbClr val="FFFFFF"/>
+      </a:lt1>
+      <a:dk2>
+        <a:srgbClr val="158158"/>
+      </a:dk2>
+      <a:lt2>
+        <a:srgbClr val="F3F3F3"/>
+      </a:lt2>
+      <a:accent1>
+        <a:srgbClr val="058DC7"/>
+      </a:accent1>
+      <a:accent2>
+        <a:srgbClr val="50B432"/>
+      </a:accent2>
+      <a:accent3>
+        <a:srgbClr val="ED561B"/>
+      </a:accent3>
+      <a:accent4>
+        <a:srgbClr val="EDEF00"/>
+      </a:accent4>
+      <a:accent5>
+        <a:srgbClr val="24CBE5"/>
+      </a:accent5>
+      <a:accent6>
+        <a:srgbClr val="64E572"/>
+      </a:accent6>
+      <a:hlink>
+        <a:srgbClr val="2200CC"/>
+      </a:hlink>
+      <a:folHlink>
+        <a:srgbClr val="551A8B"/>
+      </a:folHlink>
+    </a:clrScheme>
+    <a:fontScheme name="Office">
+      <a:majorFont>
+        <a:latin typeface="Arial"/>
+        <a:ea typeface=""/>
+        <a:cs typeface=""/>
+        <a:font script="Jpan" typeface="ＭＳ Ｐゴシック"/>
+        <a:font script="Hang" typeface="맑은 고딕"/>
+        <a:font script="Hans" typeface="宋体"/>
+        <a:font script="Hant" typeface="新細明體"/>
+        <a:font script="Arab" typeface="Times New Roman"/>
+        <a:font script="Hebr" typeface="Times New Roman"/>
+        <a:font script="Thai" typeface="Angsana New"/>
+        <a:font script="Ethi" typeface="Nyala"/>
+        <a:font script="Beng" typeface="Vrinda"/>
+        <a:font script="Gujr" typeface="Shruti"/>
+        <a:font script="Khmr" typeface="MoolBoran"/>
+        <a:font script="Knda" typeface="Tunga"/>
+        <a:font script="Guru" typeface="Raavi"/>
+        <a:font script="Cans" typeface="Euphemia"/>
+        <a:font script="Cher" typeface="Plantagenet Cherokee"/>
+        <a:font script="Yiii" typeface="Microsoft Yi Baiti"/>
+        <a:font script="Tibt" typeface="Microsoft Himalaya"/>
+        <a:font script="Thaa" typeface="MV Boli"/>
+        <a:font script="Deva" typeface="Mangal"/>
+        <a:font script="Telu" typeface="Gautami"/>
+        <a:font script="Taml" typeface="Latha"/>
+        <a:font script="Syrc" typeface="Estrangelo Edessa"/>
+        <a:font script="Orya" typeface="Kalinga"/>
+        <a:font script="Mlym" typeface="Kartika"/>
+        <a:font script="Laoo" typeface="DokChampa"/>
+        <a:font script="Sinh" typeface="Iskoola Pota"/>
+        <a:font script="Mong" typeface="Mongolian Baiti"/>
+        <a:font script="Viet" typeface="Times New Roman"/>
+        <a:font script="Uigh" typeface="Microsoft Uighur"/>
+        <a:font script="Geor" typeface="Sylfaen"/>
+      </a:majorFont>
+      <a:minorFont>
+        <a:latin typeface="Arial"/>
+        <a:ea typeface=""/>
+        <a:cs typeface=""/>
+        <a:font script="Jpan" typeface="ＭＳ Ｐゴシック"/>
+        <a:font script="Hang" typeface="맑은 고딕"/>
+        <a:font script="Hans" typeface="宋体"/>
+        <a:font script="Hant" typeface="新細明體"/>
+        <a:font script="Arab" typeface="Arial"/>
+        <a:font script="Hebr" typeface="Arial"/>
+        <a:font script="Thai" typeface="Cordia New"/>
+        <a:font script="Ethi" typeface="Nyala"/>
+        <a:font script="Beng" typeface="Vrinda"/>
+        <a:font script="Gujr" typeface="Shruti"/>
+        <a:font script="Khmr" typeface="DaunPenh"/>
+        <a:font script="Knda" typeface="Tunga"/>
+        <a:font script="Guru" typeface="Raavi"/>
+        <a:font script="Cans" typeface="Euphemia"/>
+        <a:font script="Cher" typeface="Plantagenet Cherokee"/>
+        <a:font script="Yiii" typeface="Microsoft Yi Baiti"/>
+        <a:font script="Tibt" typeface="Microsoft Himalaya"/>
+        <a:font script="Thaa" typeface="MV Boli"/>
+        <a:font script="Deva" typeface="Mangal"/>
+        <a:font script="Telu" typeface="Gautami"/>
+        <a:font script="Taml" typeface="Latha"/>
+        <a:font script="Syrc" typeface="Estrangelo Edessa"/>
+        <a:font script="Orya" typeface="Kalinga"/>
+        <a:font script="Mlym" typeface="Kartika"/>
+        <a:font script="Laoo" typeface="DokChampa"/>
+        <a:font script="Sinh" typeface="Iskoola Pota"/>
+        <a:font script="Mong" typeface="Mongolian Baiti"/>
+        <a:font script="Viet" typeface="Arial"/>
+        <a:font script="Uigh" typeface="Microsoft Uighur"/>
+        <a:font script="Geor" typeface="Sylfaen"/>
+      </a:minorFont>
+    </a:fontScheme>
+    <a:fmtScheme name="Office">
+      <a:fillStyleLst>
+        <a:solidFill>
+          <a:schemeClr val="phClr"/>
+        </a:solidFill>
+        <a:gradFill rotWithShape="1">
+          <a:gsLst>
+            <a:gs pos="0">
+              <a:schemeClr val="phClr">
+                <a:tint val="50000"/>
+                <a:satMod val="300000"/>
+              </a:schemeClr>
+            </a:gs>
+            <a:gs pos="35000">
+              <a:schemeClr val="phClr">
+                <a:tint val="37000"/>
+                <a:satMod val="300000"/>
+              </a:schemeClr>
+            </a:gs>
+            <a:gs pos="100000">
+              <a:schemeClr val="phClr">
+                <a:tint val="15000"/>
+                <a:satMod val="350000"/>
+              </a:schemeClr>
+            </a:gs>
+          </a:gsLst>
+          <a:lin ang="16200000" scaled="1"/>
+        </a:gradFill>
+        <a:gradFill rotWithShape="1">
+          <a:gsLst>
+            <a:gs pos="0">
+              <a:schemeClr val="phClr">
+                <a:tint val="100000"/>
+                <a:shade val="100000"/>
+                <a:satMod val="130000"/>
+              </a:schemeClr>
+            </a:gs>
+            <a:gs pos="100000">
+              <a:schemeClr val="phClr">
+                <a:tint val="50000"/>
+                <a:shade val="100000"/>
+                <a:satMod val="350000"/>
+              </a:schemeClr>
+            </a:gs>
+          </a:gsLst>
+          <a:lin ang="16200000" scaled="0"/>
+        </a:gradFill>
+      </a:fillStyleLst>
+      <a:lnStyleLst>
+        <a:ln w="9525" cap="flat" cmpd="sng" algn="ctr">
+          <a:solidFill>
+            <a:schemeClr val="phClr">
+              <a:shade val="95000"/>
+              <a:satMod val="105000"/>
+            </a:schemeClr>
+          </a:solidFill>
+          <a:prstDash val="solid"/>
+        </a:ln>
+        <a:ln w="25400" cap="flat" cmpd="sng" algn="ctr">
+          <a:solidFill>
+            <a:schemeClr val="phClr"/>
+          </a:solidFill>
+          <a:prstDash val="solid"/>
+        </a:ln>
+        <a:ln w="38100" cap="flat" cmpd="sng" algn="ctr">
+          <a:solidFill>
+            <a:schemeClr val="phClr"/>
+          </a:solidFill>
+          <a:prstDash val="solid"/>
+        </a:ln>
+      </a:lnStyleLst>
+      <a:effectStyleLst>
+        <a:effectStyle>
+          <a:effectLst>
+            <a:outerShdw blurRad="40000" dist="20000" dir="5400000" rotWithShape="0">
+              <a:srgbClr val="000000">
+                <a:alpha val="38000"/>
+              </a:srgbClr>
+            </a:outerShdw>
+          </a:effectLst>
+        </a:effectStyle>
+        <a:effectStyle>
+          <a:effectLst>
+            <a:outerShdw blurRad="40000" dist="23000" dir="5400000" rotWithShape="0">
+              <a:srgbClr val="000000">
+                <a:alpha val="35000"/>
+              </a:srgbClr>
+            </a:outerShdw>
+          </a:effectLst>
+        </a:effectStyle>
+        <a:effectStyle>
+          <a:effectLst>
+            <a:outerShdw blurRad="40000" dist="23000" dir="5400000" rotWithShape="0">
+              <a:srgbClr val="000000">
+                <a:alpha val="35000"/>
+              </a:srgbClr>
+            </a:outerShdw>
+          </a:effectLst>
+          <a:scene3d>
+            <a:camera prst="orthographicFront">
+              <a:rot lat="0" lon="0" rev="0"/>
+            </a:camera>
+            <a:lightRig rig="threePt" dir="t">
+              <a:rot lat="0" lon="0" rev="1200000"/>
+            </a:lightRig>
+          </a:scene3d>
+          <a:sp3d>
+            <a:bevelT w="63500" h="25400"/>
+          </a:sp3d>
+        </a:effectStyle>
+      </a:effectStyleLst>
+      <a:bgFillStyleLst>
+        <a:solidFill>
+          <a:schemeClr val="phClr"/>
+        </a:solidFill>
+        <a:gradFill rotWithShape="1">
+          <a:gsLst>
+            <a:gs pos="0">
+              <a:schemeClr val="phClr">
+                <a:tint val="40000"/>
+                <a:satMod val="350000"/>
+              </a:schemeClr>
+            </a:gs>
+            <a:gs pos="40000">
+              <a:schemeClr val="phClr">
+                <a:tint val="45000"/>
+                <a:shade val="99000"/>
+                <a:satMod val="350000"/>
+              </a:schemeClr>
+            </a:gs>
+            <a:gs pos="100000">
+              <a:schemeClr val="phClr">
+                <a:shade val="20000"/>
+                <a:satMod val="255000"/>
+              </a:schemeClr>
+            </a:gs>
+          </a:gsLst>
+          <a:path path="circle">
+            <a:fillToRect l="50000" t="-80000" r="50000" b="180000"/>
+          </a:path>
+        </a:gradFill>
+        <a:gradFill rotWithShape="1">
+          <a:gsLst>
+            <a:gs pos="0">
+              <a:schemeClr val="phClr">
+                <a:tint val="80000"/>
+                <a:satMod val="300000"/>
+              </a:schemeClr>
+            </a:gs>
+            <a:gs pos="100000">
+              <a:schemeClr val="phClr">
+                <a:shade val="30000"/>
+                <a:satMod val="200000"/>
+              </a:schemeClr>
+            </a:gs>
+          </a:gsLst>
+          <a:path path="circle">
+            <a:fillToRect l="50000" t="50000" r="50000" b="50000"/>
+          </a:path>
+        </a:gradFill>
+      </a:bgFillStyleLst>
+    </a:fmtScheme>
+  </a:themeElements>
+</a:theme>
+</file>
+
+<file path=ppt/theme/theme2.xml><?xml version="1.0" encoding="utf-8"?>
 <a:theme xmlns:a="http://schemas.openxmlformats.org/drawingml/2006/main" xmlns:r="http://schemas.openxmlformats.org/officeDocument/2006/relationships" name="Simple Light">
   <a:themeElements>
     <a:clrScheme name="Simple Light">
@@ -9839,283 +10436,4 @@
     </a:fmtScheme>
   </a:themeElements>
 </a:theme>
-</file>
-
-<file path=ppt/theme/theme2.xml><?xml version="1.0" encoding="utf-8"?>
-<a:theme xmlns:a="http://schemas.openxmlformats.org/drawingml/2006/main" xmlns:r="http://schemas.openxmlformats.org/officeDocument/2006/relationships">
-  <a:themeElements>
-    <a:clrScheme name="Default">
-      <a:dk1>
-        <a:srgbClr val="000000"/>
-      </a:dk1>
-      <a:lt1>
-        <a:srgbClr val="FFFFFF"/>
-      </a:lt1>
-      <a:dk2>
-        <a:srgbClr val="158158"/>
-      </a:dk2>
-      <a:lt2>
-        <a:srgbClr val="F3F3F3"/>
-      </a:lt2>
-      <a:accent1>
-        <a:srgbClr val="058DC7"/>
-      </a:accent1>
-      <a:accent2>
-        <a:srgbClr val="50B432"/>
-      </a:accent2>
-      <a:accent3>
-        <a:srgbClr val="ED561B"/>
-      </a:accent3>
-      <a:accent4>
-        <a:srgbClr val="EDEF00"/>
-      </a:accent4>
-      <a:accent5>
-        <a:srgbClr val="24CBE5"/>
-      </a:accent5>
-      <a:accent6>
-        <a:srgbClr val="64E572"/>
-      </a:accent6>
-      <a:hlink>
-        <a:srgbClr val="2200CC"/>
-      </a:hlink>
-      <a:folHlink>
-        <a:srgbClr val="551A8B"/>
-      </a:folHlink>
-    </a:clrScheme>
-    <a:fontScheme name="Office">
-      <a:majorFont>
-        <a:latin typeface="Arial"/>
-        <a:ea typeface=""/>
-        <a:cs typeface=""/>
-        <a:font script="Jpan" typeface="ＭＳ Ｐゴシック"/>
-        <a:font script="Hang" typeface="맑은 고딕"/>
-        <a:font script="Hans" typeface="宋体"/>
-        <a:font script="Hant" typeface="新細明體"/>
-        <a:font script="Arab" typeface="Times New Roman"/>
-        <a:font script="Hebr" typeface="Times New Roman"/>
-        <a:font script="Thai" typeface="Angsana New"/>
-        <a:font script="Ethi" typeface="Nyala"/>
-        <a:font script="Beng" typeface="Vrinda"/>
-        <a:font script="Gujr" typeface="Shruti"/>
-        <a:font script="Khmr" typeface="MoolBoran"/>
-        <a:font script="Knda" typeface="Tunga"/>
-        <a:font script="Guru" typeface="Raavi"/>
-        <a:font script="Cans" typeface="Euphemia"/>
-        <a:font script="Cher" typeface="Plantagenet Cherokee"/>
-        <a:font script="Yiii" typeface="Microsoft Yi Baiti"/>
-        <a:font script="Tibt" typeface="Microsoft Himalaya"/>
-        <a:font script="Thaa" typeface="MV Boli"/>
-        <a:font script="Deva" typeface="Mangal"/>
-        <a:font script="Telu" typeface="Gautami"/>
-        <a:font script="Taml" typeface="Latha"/>
-        <a:font script="Syrc" typeface="Estrangelo Edessa"/>
-        <a:font script="Orya" typeface="Kalinga"/>
-        <a:font script="Mlym" typeface="Kartika"/>
-        <a:font script="Laoo" typeface="DokChampa"/>
-        <a:font script="Sinh" typeface="Iskoola Pota"/>
-        <a:font script="Mong" typeface="Mongolian Baiti"/>
-        <a:font script="Viet" typeface="Times New Roman"/>
-        <a:font script="Uigh" typeface="Microsoft Uighur"/>
-        <a:font script="Geor" typeface="Sylfaen"/>
-      </a:majorFont>
-      <a:minorFont>
-        <a:latin typeface="Arial"/>
-        <a:ea typeface=""/>
-        <a:cs typeface=""/>
-        <a:font script="Jpan" typeface="ＭＳ Ｐゴシック"/>
-        <a:font script="Hang" typeface="맑은 고딕"/>
-        <a:font script="Hans" typeface="宋体"/>
-        <a:font script="Hant" typeface="新細明體"/>
-        <a:font script="Arab" typeface="Arial"/>
-        <a:font script="Hebr" typeface="Arial"/>
-        <a:font script="Thai" typeface="Cordia New"/>
-        <a:font script="Ethi" typeface="Nyala"/>
-        <a:font script="Beng" typeface="Vrinda"/>
-        <a:font script="Gujr" typeface="Shruti"/>
-        <a:font script="Khmr" typeface="DaunPenh"/>
-        <a:font script="Knda" typeface="Tunga"/>
-        <a:font script="Guru" typeface="Raavi"/>
-        <a:font script="Cans" typeface="Euphemia"/>
-        <a:font script="Cher" typeface="Plantagenet Cherokee"/>
-        <a:font script="Yiii" typeface="Microsoft Yi Baiti"/>
-        <a:font script="Tibt" typeface="Microsoft Himalaya"/>
-        <a:font script="Thaa" typeface="MV Boli"/>
-        <a:font script="Deva" typeface="Mangal"/>
-        <a:font script="Telu" typeface="Gautami"/>
-        <a:font script="Taml" typeface="Latha"/>
-        <a:font script="Syrc" typeface="Estrangelo Edessa"/>
-        <a:font script="Orya" typeface="Kalinga"/>
-        <a:font script="Mlym" typeface="Kartika"/>
-        <a:font script="Laoo" typeface="DokChampa"/>
-        <a:font script="Sinh" typeface="Iskoola Pota"/>
-        <a:font script="Mong" typeface="Mongolian Baiti"/>
-        <a:font script="Viet" typeface="Arial"/>
-        <a:font script="Uigh" typeface="Microsoft Uighur"/>
-        <a:font script="Geor" typeface="Sylfaen"/>
-      </a:minorFont>
-    </a:fontScheme>
-    <a:fmtScheme name="Office">
-      <a:fillStyleLst>
-        <a:solidFill>
-          <a:schemeClr val="phClr"/>
-        </a:solidFill>
-        <a:gradFill rotWithShape="1">
-          <a:gsLst>
-            <a:gs pos="0">
-              <a:schemeClr val="phClr">
-                <a:tint val="50000"/>
-                <a:satMod val="300000"/>
-              </a:schemeClr>
-            </a:gs>
-            <a:gs pos="35000">
-              <a:schemeClr val="phClr">
-                <a:tint val="37000"/>
-                <a:satMod val="300000"/>
-              </a:schemeClr>
-            </a:gs>
-            <a:gs pos="100000">
-              <a:schemeClr val="phClr">
-                <a:tint val="15000"/>
-                <a:satMod val="350000"/>
-              </a:schemeClr>
-            </a:gs>
-          </a:gsLst>
-          <a:lin ang="16200000" scaled="1"/>
-        </a:gradFill>
-        <a:gradFill rotWithShape="1">
-          <a:gsLst>
-            <a:gs pos="0">
-              <a:schemeClr val="phClr">
-                <a:tint val="100000"/>
-                <a:shade val="100000"/>
-                <a:satMod val="130000"/>
-              </a:schemeClr>
-            </a:gs>
-            <a:gs pos="100000">
-              <a:schemeClr val="phClr">
-                <a:tint val="50000"/>
-                <a:shade val="100000"/>
-                <a:satMod val="350000"/>
-              </a:schemeClr>
-            </a:gs>
-          </a:gsLst>
-          <a:lin ang="16200000" scaled="0"/>
-        </a:gradFill>
-      </a:fillStyleLst>
-      <a:lnStyleLst>
-        <a:ln w="9525" cap="flat" cmpd="sng" algn="ctr">
-          <a:solidFill>
-            <a:schemeClr val="phClr">
-              <a:shade val="95000"/>
-              <a:satMod val="105000"/>
-            </a:schemeClr>
-          </a:solidFill>
-          <a:prstDash val="solid"/>
-        </a:ln>
-        <a:ln w="25400" cap="flat" cmpd="sng" algn="ctr">
-          <a:solidFill>
-            <a:schemeClr val="phClr"/>
-          </a:solidFill>
-          <a:prstDash val="solid"/>
-        </a:ln>
-        <a:ln w="38100" cap="flat" cmpd="sng" algn="ctr">
-          <a:solidFill>
-            <a:schemeClr val="phClr"/>
-          </a:solidFill>
-          <a:prstDash val="solid"/>
-        </a:ln>
-      </a:lnStyleLst>
-      <a:effectStyleLst>
-        <a:effectStyle>
-          <a:effectLst>
-            <a:outerShdw blurRad="40000" dist="20000" dir="5400000" rotWithShape="0">
-              <a:srgbClr val="000000">
-                <a:alpha val="38000"/>
-              </a:srgbClr>
-            </a:outerShdw>
-          </a:effectLst>
-        </a:effectStyle>
-        <a:effectStyle>
-          <a:effectLst>
-            <a:outerShdw blurRad="40000" dist="23000" dir="5400000" rotWithShape="0">
-              <a:srgbClr val="000000">
-                <a:alpha val="35000"/>
-              </a:srgbClr>
-            </a:outerShdw>
-          </a:effectLst>
-        </a:effectStyle>
-        <a:effectStyle>
-          <a:effectLst>
-            <a:outerShdw blurRad="40000" dist="23000" dir="5400000" rotWithShape="0">
-              <a:srgbClr val="000000">
-                <a:alpha val="35000"/>
-              </a:srgbClr>
-            </a:outerShdw>
-          </a:effectLst>
-          <a:scene3d>
-            <a:camera prst="orthographicFront">
-              <a:rot lat="0" lon="0" rev="0"/>
-            </a:camera>
-            <a:lightRig rig="threePt" dir="t">
-              <a:rot lat="0" lon="0" rev="1200000"/>
-            </a:lightRig>
-          </a:scene3d>
-          <a:sp3d>
-            <a:bevelT w="63500" h="25400"/>
-          </a:sp3d>
-        </a:effectStyle>
-      </a:effectStyleLst>
-      <a:bgFillStyleLst>
-        <a:solidFill>
-          <a:schemeClr val="phClr"/>
-        </a:solidFill>
-        <a:gradFill rotWithShape="1">
-          <a:gsLst>
-            <a:gs pos="0">
-              <a:schemeClr val="phClr">
-                <a:tint val="40000"/>
-                <a:satMod val="350000"/>
-              </a:schemeClr>
-            </a:gs>
-            <a:gs pos="40000">
-              <a:schemeClr val="phClr">
-                <a:tint val="45000"/>
-                <a:shade val="99000"/>
-                <a:satMod val="350000"/>
-              </a:schemeClr>
-            </a:gs>
-            <a:gs pos="100000">
-              <a:schemeClr val="phClr">
-                <a:shade val="20000"/>
-                <a:satMod val="255000"/>
-              </a:schemeClr>
-            </a:gs>
-          </a:gsLst>
-          <a:path path="circle">
-            <a:fillToRect l="50000" t="-80000" r="50000" b="180000"/>
-          </a:path>
-        </a:gradFill>
-        <a:gradFill rotWithShape="1">
-          <a:gsLst>
-            <a:gs pos="0">
-              <a:schemeClr val="phClr">
-                <a:tint val="80000"/>
-                <a:satMod val="300000"/>
-              </a:schemeClr>
-            </a:gs>
-            <a:gs pos="100000">
-              <a:schemeClr val="phClr">
-                <a:shade val="30000"/>
-                <a:satMod val="200000"/>
-              </a:schemeClr>
-            </a:gs>
-          </a:gsLst>
-          <a:path path="circle">
-            <a:fillToRect l="50000" t="50000" r="50000" b="50000"/>
-          </a:path>
-        </a:gradFill>
-      </a:bgFillStyleLst>
-    </a:fmtScheme>
-  </a:themeElements>
-</a:theme>
 </file>
</xml_diff>